<commit_message>
Opravene prezentacie -> Dominik
</commit_message>
<xml_diff>
--- a/doc/presentation/Prezentacia.pptx
+++ b/doc/presentation/Prezentacia.pptx
@@ -26,7 +26,6 @@
     <p:sldId id="274" r:id="rId21"/>
     <p:sldId id="275" r:id="rId22"/>
     <p:sldId id="276" r:id="rId23"/>
-    <p:sldId id="277" r:id="rId24"/>
   </p:sldIdLst>
   <p:sldSz cx="10080625" cy="7559675"/>
   <p:notesSz cx="7559675" cy="10691812"/>
@@ -1446,7 +1445,7 @@
           <a:bodyPr lIns="0" rIns="0" tIns="0" bIns="0"/>
           <a:p>
             <a:pPr algn="r"/>
-            <a:fld id="{AF600813-9CDF-4501-9F82-286CB470E373}" type="slidenum">
+            <a:fld id="{2A3D7521-9644-4AEE-AB28-9B47320000E7}" type="slidenum">
               <a:rPr lang="en-GB" sz="1400">
                 <a:latin typeface="DejaVu Serif"/>
               </a:rPr>
@@ -1562,33 +1561,6 @@
       </p:sp>
     </p:spTree>
   </p:cSld>
-  <p:timing>
-    <p:tnLst>
-      <p:par>
-        <p:cTn id="1" dur="indefinite" restart="never" nodeType="tmRoot">
-          <p:childTnLst>
-            <p:seq>
-              <p:cTn id="2" nodeType="mainSeq"/>
-              <p:prevCondLst>
-                <p:cond delay="0" evt="onPrev">
-                  <p:tgtEl>
-                    <p:sldTgt/>
-                  </p:tgtEl>
-                </p:cond>
-              </p:prevCondLst>
-              <p:nextCondLst>
-                <p:cond delay="0" evt="onNext">
-                  <p:tgtEl>
-                    <p:sldTgt/>
-                  </p:tgtEl>
-                </p:cond>
-              </p:nextCondLst>
-            </p:seq>
-          </p:childTnLst>
-        </p:cTn>
-      </p:par>
-    </p:tnLst>
-  </p:timing>
 </p:sld>
 </file>
 
@@ -1636,7 +1608,7 @@
               <a:rPr lang="en-GB" sz="4400">
                 <a:latin typeface="DejaVu Sans"/>
               </a:rPr>
-              <a:t>Načítanie ODS Súboru</a:t>
+              <a:t>Načítanie ODS súboru</a:t>
             </a:r>
             <a:endParaRPr/>
           </a:p>
@@ -1667,33 +1639,6 @@
       </p:pic>
     </p:spTree>
   </p:cSld>
-  <p:timing>
-    <p:tnLst>
-      <p:par>
-        <p:cTn id="19" dur="indefinite" restart="never" nodeType="tmRoot">
-          <p:childTnLst>
-            <p:seq>
-              <p:cTn id="20" nodeType="mainSeq"/>
-              <p:prevCondLst>
-                <p:cond delay="0" evt="onPrev">
-                  <p:tgtEl>
-                    <p:sldTgt/>
-                  </p:tgtEl>
-                </p:cond>
-              </p:prevCondLst>
-              <p:nextCondLst>
-                <p:cond delay="0" evt="onNext">
-                  <p:tgtEl>
-                    <p:sldTgt/>
-                  </p:tgtEl>
-                </p:cond>
-              </p:nextCondLst>
-            </p:seq>
-          </p:childTnLst>
-        </p:cTn>
-      </p:par>
-    </p:tnLst>
-  </p:timing>
 </p:sld>
 </file>
 
@@ -1741,7 +1686,7 @@
               <a:rPr lang="en-GB" sz="4400">
                 <a:latin typeface="DejaVu Sans"/>
               </a:rPr>
-              <a:t>Prepínanie Kategórii</a:t>
+              <a:t>Prepínanie kategórii</a:t>
             </a:r>
             <a:endParaRPr/>
           </a:p>
@@ -1772,33 +1717,6 @@
       </p:pic>
     </p:spTree>
   </p:cSld>
-  <p:timing>
-    <p:tnLst>
-      <p:par>
-        <p:cTn id="21" dur="indefinite" restart="never" nodeType="tmRoot">
-          <p:childTnLst>
-            <p:seq>
-              <p:cTn id="22" nodeType="mainSeq"/>
-              <p:prevCondLst>
-                <p:cond delay="0" evt="onPrev">
-                  <p:tgtEl>
-                    <p:sldTgt/>
-                  </p:tgtEl>
-                </p:cond>
-              </p:prevCondLst>
-              <p:nextCondLst>
-                <p:cond delay="0" evt="onNext">
-                  <p:tgtEl>
-                    <p:sldTgt/>
-                  </p:tgtEl>
-                </p:cond>
-              </p:nextCondLst>
-            </p:seq>
-          </p:childTnLst>
-        </p:cTn>
-      </p:par>
-    </p:tnLst>
-  </p:timing>
 </p:sld>
 </file>
 
@@ -1877,33 +1795,6 @@
       </p:pic>
     </p:spTree>
   </p:cSld>
-  <p:timing>
-    <p:tnLst>
-      <p:par>
-        <p:cTn id="23" dur="indefinite" restart="never" nodeType="tmRoot">
-          <p:childTnLst>
-            <p:seq>
-              <p:cTn id="24" nodeType="mainSeq"/>
-              <p:prevCondLst>
-                <p:cond delay="0" evt="onPrev">
-                  <p:tgtEl>
-                    <p:sldTgt/>
-                  </p:tgtEl>
-                </p:cond>
-              </p:prevCondLst>
-              <p:nextCondLst>
-                <p:cond delay="0" evt="onNext">
-                  <p:tgtEl>
-                    <p:sldTgt/>
-                  </p:tgtEl>
-                </p:cond>
-              </p:nextCondLst>
-            </p:seq>
-          </p:childTnLst>
-        </p:cTn>
-      </p:par>
-    </p:tnLst>
-  </p:timing>
 </p:sld>
 </file>
 
@@ -1982,33 +1873,6 @@
       </p:pic>
     </p:spTree>
   </p:cSld>
-  <p:timing>
-    <p:tnLst>
-      <p:par>
-        <p:cTn id="25" dur="indefinite" restart="never" nodeType="tmRoot">
-          <p:childTnLst>
-            <p:seq>
-              <p:cTn id="26" nodeType="mainSeq"/>
-              <p:prevCondLst>
-                <p:cond delay="0" evt="onPrev">
-                  <p:tgtEl>
-                    <p:sldTgt/>
-                  </p:tgtEl>
-                </p:cond>
-              </p:prevCondLst>
-              <p:nextCondLst>
-                <p:cond delay="0" evt="onNext">
-                  <p:tgtEl>
-                    <p:sldTgt/>
-                  </p:tgtEl>
-                </p:cond>
-              </p:nextCondLst>
-            </p:seq>
-          </p:childTnLst>
-        </p:cTn>
-      </p:par>
-    </p:tnLst>
-  </p:timing>
 </p:sld>
 </file>
 
@@ -2056,7 +1920,7 @@
               <a:rPr lang="en-GB" sz="4400">
                 <a:latin typeface="DejaVu Sans"/>
               </a:rPr>
-              <a:t>Pridanie Filmu</a:t>
+              <a:t>Pridanie filmu</a:t>
             </a:r>
             <a:endParaRPr/>
           </a:p>
@@ -2087,33 +1951,6 @@
       </p:pic>
     </p:spTree>
   </p:cSld>
-  <p:timing>
-    <p:tnLst>
-      <p:par>
-        <p:cTn id="27" dur="indefinite" restart="never" nodeType="tmRoot">
-          <p:childTnLst>
-            <p:seq>
-              <p:cTn id="28" nodeType="mainSeq"/>
-              <p:prevCondLst>
-                <p:cond delay="0" evt="onPrev">
-                  <p:tgtEl>
-                    <p:sldTgt/>
-                  </p:tgtEl>
-                </p:cond>
-              </p:prevCondLst>
-              <p:nextCondLst>
-                <p:cond delay="0" evt="onNext">
-                  <p:tgtEl>
-                    <p:sldTgt/>
-                  </p:tgtEl>
-                </p:cond>
-              </p:nextCondLst>
-            </p:seq>
-          </p:childTnLst>
-        </p:cTn>
-      </p:par>
-    </p:tnLst>
-  </p:timing>
 </p:sld>
 </file>
 
@@ -2192,33 +2029,6 @@
       </p:pic>
     </p:spTree>
   </p:cSld>
-  <p:timing>
-    <p:tnLst>
-      <p:par>
-        <p:cTn id="29" dur="indefinite" restart="never" nodeType="tmRoot">
-          <p:childTnLst>
-            <p:seq>
-              <p:cTn id="30" nodeType="mainSeq"/>
-              <p:prevCondLst>
-                <p:cond delay="0" evt="onPrev">
-                  <p:tgtEl>
-                    <p:sldTgt/>
-                  </p:tgtEl>
-                </p:cond>
-              </p:prevCondLst>
-              <p:nextCondLst>
-                <p:cond delay="0" evt="onNext">
-                  <p:tgtEl>
-                    <p:sldTgt/>
-                  </p:tgtEl>
-                </p:cond>
-              </p:nextCondLst>
-            </p:seq>
-          </p:childTnLst>
-        </p:cTn>
-      </p:par>
-    </p:tnLst>
-  </p:timing>
 </p:sld>
 </file>
 
@@ -2297,33 +2107,6 @@
       </p:pic>
     </p:spTree>
   </p:cSld>
-  <p:timing>
-    <p:tnLst>
-      <p:par>
-        <p:cTn id="31" dur="indefinite" restart="never" nodeType="tmRoot">
-          <p:childTnLst>
-            <p:seq>
-              <p:cTn id="32" nodeType="mainSeq"/>
-              <p:prevCondLst>
-                <p:cond delay="0" evt="onPrev">
-                  <p:tgtEl>
-                    <p:sldTgt/>
-                  </p:tgtEl>
-                </p:cond>
-              </p:prevCondLst>
-              <p:nextCondLst>
-                <p:cond delay="0" evt="onNext">
-                  <p:tgtEl>
-                    <p:sldTgt/>
-                  </p:tgtEl>
-                </p:cond>
-              </p:nextCondLst>
-            </p:seq>
-          </p:childTnLst>
-        </p:cTn>
-      </p:par>
-    </p:tnLst>
-  </p:timing>
 </p:sld>
 </file>
 
@@ -2402,33 +2185,6 @@
       </p:pic>
     </p:spTree>
   </p:cSld>
-  <p:timing>
-    <p:tnLst>
-      <p:par>
-        <p:cTn id="33" dur="indefinite" restart="never" nodeType="tmRoot">
-          <p:childTnLst>
-            <p:seq>
-              <p:cTn id="34" nodeType="mainSeq"/>
-              <p:prevCondLst>
-                <p:cond delay="0" evt="onPrev">
-                  <p:tgtEl>
-                    <p:sldTgt/>
-                  </p:tgtEl>
-                </p:cond>
-              </p:prevCondLst>
-              <p:nextCondLst>
-                <p:cond delay="0" evt="onNext">
-                  <p:tgtEl>
-                    <p:sldTgt/>
-                  </p:tgtEl>
-                </p:cond>
-              </p:nextCondLst>
-            </p:seq>
-          </p:childTnLst>
-        </p:cTn>
-      </p:par>
-    </p:tnLst>
-  </p:timing>
 </p:sld>
 </file>
 
@@ -2507,33 +2263,6 @@
       </p:pic>
     </p:spTree>
   </p:cSld>
-  <p:timing>
-    <p:tnLst>
-      <p:par>
-        <p:cTn id="35" dur="indefinite" restart="never" nodeType="tmRoot">
-          <p:childTnLst>
-            <p:seq>
-              <p:cTn id="36" nodeType="mainSeq"/>
-              <p:prevCondLst>
-                <p:cond delay="0" evt="onPrev">
-                  <p:tgtEl>
-                    <p:sldTgt/>
-                  </p:tgtEl>
-                </p:cond>
-              </p:prevCondLst>
-              <p:nextCondLst>
-                <p:cond delay="0" evt="onNext">
-                  <p:tgtEl>
-                    <p:sldTgt/>
-                  </p:tgtEl>
-                </p:cond>
-              </p:nextCondLst>
-            </p:seq>
-          </p:childTnLst>
-        </p:cTn>
-      </p:par>
-    </p:tnLst>
-  </p:timing>
 </p:sld>
 </file>
 
@@ -2581,7 +2310,7 @@
               <a:rPr lang="en-GB" sz="4400">
                 <a:latin typeface="DejaVu Sans"/>
               </a:rPr>
-              <a:t>Filter filmov v kategorii</a:t>
+              <a:t>Filter filmov v kategórii</a:t>
             </a:r>
             <a:endParaRPr/>
           </a:p>
@@ -2612,33 +2341,6 @@
       </p:pic>
     </p:spTree>
   </p:cSld>
-  <p:timing>
-    <p:tnLst>
-      <p:par>
-        <p:cTn id="37" dur="indefinite" restart="never" nodeType="tmRoot">
-          <p:childTnLst>
-            <p:seq>
-              <p:cTn id="38" nodeType="mainSeq"/>
-              <p:prevCondLst>
-                <p:cond delay="0" evt="onPrev">
-                  <p:tgtEl>
-                    <p:sldTgt/>
-                  </p:tgtEl>
-                </p:cond>
-              </p:prevCondLst>
-              <p:nextCondLst>
-                <p:cond delay="0" evt="onNext">
-                  <p:tgtEl>
-                    <p:sldTgt/>
-                  </p:tgtEl>
-                </p:cond>
-              </p:nextCondLst>
-            </p:seq>
-          </p:childTnLst>
-        </p:cTn>
-      </p:par>
-    </p:tnLst>
-  </p:timing>
 </p:sld>
 </file>
 
@@ -2721,27 +2423,9 @@
             </a:pPr>
             <a:r>
               <a:rPr lang="en-GB" sz="3200">
-                <a:latin typeface="DejaVu Sans Mono"/>
-              </a:rPr>
-              <a:t>Dominik Labuda  </a:t>
-            </a:r>
-            <a:r>
-              <a:rPr lang="en-GB" sz="2000">
-                <a:latin typeface="DejaVu Sans Mono"/>
-              </a:rPr>
-              <a:t>(410150)</a:t>
-            </a:r>
-            <a:r>
-              <a:rPr lang="en-GB" sz="3200">
-                <a:latin typeface="DejaVu Sans Mono"/>
-              </a:rPr>
-              <a:t>  </a:t>
-            </a:r>
-            <a:r>
-              <a:rPr lang="en-GB" sz="2000">
-                <a:latin typeface="DejaVu Sans Mono"/>
-              </a:rPr>
-              <a:t>@dominick1993</a:t>
+                <a:latin typeface="DejaVu Sans"/>
+              </a:rPr>
+              <a:t>Dominik Labuda (410150) @dominick1993</a:t>
             </a:r>
             <a:endParaRPr/>
           </a:p>
@@ -2753,27 +2437,9 @@
             </a:pPr>
             <a:r>
               <a:rPr lang="en-GB" sz="3200">
-                <a:latin typeface="DejaVu Sans Mono"/>
-              </a:rPr>
-              <a:t>Peter Stanko    </a:t>
-            </a:r>
-            <a:r>
-              <a:rPr lang="en-GB" sz="2000">
-                <a:latin typeface="DejaVu Sans Mono"/>
-              </a:rPr>
-              <a:t>(410338) </a:t>
-            </a:r>
-            <a:r>
-              <a:rPr lang="en-GB" sz="3200">
-                <a:latin typeface="DejaVu Sans Mono"/>
-              </a:rPr>
-              <a:t> </a:t>
-            </a:r>
-            <a:r>
-              <a:rPr lang="en-GB" sz="2000">
-                <a:latin typeface="DejaVu Sans Mono"/>
-              </a:rPr>
-              <a:t>@wermington</a:t>
+                <a:latin typeface="DejaVu Sans"/>
+              </a:rPr>
+              <a:t>Peter Stanko (410338) @wermington</a:t>
             </a:r>
             <a:endParaRPr/>
           </a:p>
@@ -2785,27 +2451,9 @@
             </a:pPr>
             <a:r>
               <a:rPr lang="en-GB" sz="3200">
-                <a:latin typeface="DejaVu Sans Mono"/>
-              </a:rPr>
-              <a:t>Peter Zaoral    </a:t>
-            </a:r>
-            <a:r>
-              <a:rPr lang="en-GB" sz="2000">
-                <a:latin typeface="DejaVu Sans Mono"/>
-              </a:rPr>
-              <a:t>(410404)</a:t>
-            </a:r>
-            <a:r>
-              <a:rPr lang="en-GB" sz="3200">
-                <a:latin typeface="DejaVu Sans Mono"/>
-              </a:rPr>
-              <a:t>  </a:t>
-            </a:r>
-            <a:r>
-              <a:rPr lang="en-GB" sz="2000">
-                <a:latin typeface="DejaVu Sans Mono"/>
-              </a:rPr>
-              <a:t>@pepo48</a:t>
+                <a:latin typeface="DejaVu Sans"/>
+              </a:rPr>
+              <a:t>Peter Zaoral (410404) @pepo48</a:t>
             </a:r>
             <a:endParaRPr/>
           </a:p>
@@ -2813,33 +2461,6 @@
       </p:sp>
     </p:spTree>
   </p:cSld>
-  <p:timing>
-    <p:tnLst>
-      <p:par>
-        <p:cTn id="3" dur="indefinite" restart="never" nodeType="tmRoot">
-          <p:childTnLst>
-            <p:seq>
-              <p:cTn id="4" nodeType="mainSeq"/>
-              <p:prevCondLst>
-                <p:cond delay="0" evt="onPrev">
-                  <p:tgtEl>
-                    <p:sldTgt/>
-                  </p:tgtEl>
-                </p:cond>
-              </p:prevCondLst>
-              <p:nextCondLst>
-                <p:cond delay="0" evt="onNext">
-                  <p:tgtEl>
-                    <p:sldTgt/>
-                  </p:tgtEl>
-                </p:cond>
-              </p:nextCondLst>
-            </p:seq>
-          </p:childTnLst>
-        </p:cTn>
-      </p:par>
-    </p:tnLst>
-  </p:timing>
 </p:sld>
 </file>
 
@@ -2918,33 +2539,6 @@
       </p:pic>
     </p:spTree>
   </p:cSld>
-  <p:timing>
-    <p:tnLst>
-      <p:par>
-        <p:cTn id="39" dur="indefinite" restart="never" nodeType="tmRoot">
-          <p:childTnLst>
-            <p:seq>
-              <p:cTn id="40" nodeType="mainSeq"/>
-              <p:prevCondLst>
-                <p:cond delay="0" evt="onPrev">
-                  <p:tgtEl>
-                    <p:sldTgt/>
-                  </p:tgtEl>
-                </p:cond>
-              </p:prevCondLst>
-              <p:nextCondLst>
-                <p:cond delay="0" evt="onNext">
-                  <p:tgtEl>
-                    <p:sldTgt/>
-                  </p:tgtEl>
-                </p:cond>
-              </p:nextCondLst>
-            </p:seq>
-          </p:childTnLst>
-        </p:cTn>
-      </p:par>
-    </p:tnLst>
-  </p:timing>
 </p:sld>
 </file>
 
@@ -2974,7 +2568,7 @@
         <p:spPr>
           <a:xfrm>
             <a:off x="504000" y="301320"/>
-            <a:ext cx="9071640" cy="1262160"/>
+            <a:ext cx="9071640" cy="5851800"/>
           </a:xfrm>
           <a:prstGeom prst="rect">
             <a:avLst/>
@@ -2989,149 +2583,17 @@
           <a:p>
             <a:pPr algn="ctr"/>
             <a:r>
-              <a:rPr lang="en-GB" sz="4400">
-                <a:latin typeface="DejaVu Sans"/>
-              </a:rPr>
-              <a:t>Príklad kartotéky</a:t>
-            </a:r>
-            <a:endParaRPr/>
-          </a:p>
-        </p:txBody>
-      </p:sp>
-      <p:pic>
-        <p:nvPicPr>
-          <p:cNvPr id="79" name="" descr=""/>
-          <p:cNvPicPr/>
-          <p:nvPr/>
-        </p:nvPicPr>
-        <p:blipFill>
-          <a:blip r:embed="rId1"/>
-          <a:stretch/>
-        </p:blipFill>
-        <p:spPr>
-          <a:xfrm>
-            <a:off x="503640" y="1855080"/>
-            <a:ext cx="9071640" cy="4211640"/>
-          </a:xfrm>
-          <a:prstGeom prst="rect">
-            <a:avLst/>
-          </a:prstGeom>
-          <a:ln>
-            <a:noFill/>
-          </a:ln>
-        </p:spPr>
-      </p:pic>
+              <a:rPr lang="en-GB" sz="4500">
+                <a:latin typeface="DejaVu Sans"/>
+              </a:rPr>
+              <a:t>Ďakujeme za pozornosť</a:t>
+            </a:r>
+            <a:endParaRPr/>
+          </a:p>
+        </p:txBody>
+      </p:sp>
     </p:spTree>
   </p:cSld>
-  <p:timing>
-    <p:tnLst>
-      <p:par>
-        <p:cTn id="41" dur="indefinite" restart="never" nodeType="tmRoot">
-          <p:childTnLst>
-            <p:seq>
-              <p:cTn id="42" nodeType="mainSeq"/>
-              <p:prevCondLst>
-                <p:cond delay="0" evt="onPrev">
-                  <p:tgtEl>
-                    <p:sldTgt/>
-                  </p:tgtEl>
-                </p:cond>
-              </p:prevCondLst>
-              <p:nextCondLst>
-                <p:cond delay="0" evt="onNext">
-                  <p:tgtEl>
-                    <p:sldTgt/>
-                  </p:tgtEl>
-                </p:cond>
-              </p:nextCondLst>
-            </p:seq>
-          </p:childTnLst>
-        </p:cTn>
-      </p:par>
-    </p:tnLst>
-  </p:timing>
-</p:sld>
-</file>
-
-<file path=ppt/slides/slide22.xml><?xml version="1.0" encoding="utf-8"?>
-<p:sld xmlns:a="http://schemas.openxmlformats.org/drawingml/2006/main" xmlns:p="http://schemas.openxmlformats.org/presentationml/2006/main" xmlns:r="http://schemas.openxmlformats.org/officeDocument/2006/relationships">
-  <p:cSld>
-    <p:spTree>
-      <p:nvGrpSpPr>
-        <p:cNvPr id="1" name=""/>
-        <p:cNvGrpSpPr/>
-        <p:nvPr/>
-      </p:nvGrpSpPr>
-      <p:grpSpPr>
-        <a:xfrm>
-          <a:off x="0" y="0"/>
-          <a:ext cx="0" cy="0"/>
-          <a:chOff x="0" y="0"/>
-          <a:chExt cx="0" cy="0"/>
-        </a:xfrm>
-      </p:grpSpPr>
-      <p:sp>
-        <p:nvSpPr>
-          <p:cNvPr id="80" name="TextShape 1"/>
-          <p:cNvSpPr txBox="1"/>
-          <p:nvPr/>
-        </p:nvSpPr>
-        <p:spPr>
-          <a:xfrm>
-            <a:off x="504000" y="301320"/>
-            <a:ext cx="9071640" cy="5851800"/>
-          </a:xfrm>
-          <a:prstGeom prst="rect">
-            <a:avLst/>
-          </a:prstGeom>
-          <a:noFill/>
-          <a:ln>
-            <a:noFill/>
-          </a:ln>
-        </p:spPr>
-        <p:txBody>
-          <a:bodyPr lIns="0" rIns="0" tIns="0" bIns="0" anchor="ctr"/>
-          <a:p>
-            <a:pPr algn="ctr"/>
-            <a:r>
-              <a:rPr lang="en-GB" sz="4500">
-                <a:latin typeface="DejaVu Sans"/>
-              </a:rPr>
-              <a:t>Ďakujeme za pozornosť</a:t>
-            </a:r>
-            <a:endParaRPr/>
-          </a:p>
-        </p:txBody>
-      </p:sp>
-    </p:spTree>
-  </p:cSld>
-  <p:timing>
-    <p:tnLst>
-      <p:par>
-        <p:cTn id="43" dur="indefinite" restart="never" nodeType="tmRoot">
-          <p:childTnLst>
-            <p:seq>
-              <p:cTn id="44" nodeType="mainSeq"/>
-              <p:prevCondLst>
-                <p:cond delay="0" evt="onPrev">
-                  <p:tgtEl>
-                    <p:sldTgt/>
-                  </p:tgtEl>
-                </p:cond>
-              </p:prevCondLst>
-              <p:nextCondLst>
-                <p:cond delay="0" evt="onNext">
-                  <p:tgtEl>
-                    <p:sldTgt/>
-                  </p:tgtEl>
-                </p:cond>
-              </p:nextCondLst>
-            </p:seq>
-          </p:childTnLst>
-        </p:cTn>
-      </p:par>
-    </p:tnLst>
-  </p:timing>
 </p:sld>
 </file>
 
@@ -3179,7 +2641,7 @@
               <a:rPr lang="en-GB" sz="4400">
                 <a:latin typeface="DejaVu Sans"/>
               </a:rPr>
-              <a:t>Project pages</a:t>
+              <a:t>Stránky projektu</a:t>
             </a:r>
             <a:endParaRPr/>
           </a:p>
@@ -3216,7 +2678,7 @@
               <a:rPr lang="en-GB" sz="3200">
                 <a:latin typeface="DejaVu Sans"/>
               </a:rPr>
-              <a:t>Github repozitar</a:t>
+              <a:t>Github repozitár</a:t>
             </a:r>
             <a:endParaRPr/>
           </a:p>
@@ -3294,33 +2756,6 @@
       </p:sp>
     </p:spTree>
   </p:cSld>
-  <p:timing>
-    <p:tnLst>
-      <p:par>
-        <p:cTn id="5" dur="indefinite" restart="never" nodeType="tmRoot">
-          <p:childTnLst>
-            <p:seq>
-              <p:cTn id="6" nodeType="mainSeq"/>
-              <p:prevCondLst>
-                <p:cond delay="0" evt="onPrev">
-                  <p:tgtEl>
-                    <p:sldTgt/>
-                  </p:tgtEl>
-                </p:cond>
-              </p:prevCondLst>
-              <p:nextCondLst>
-                <p:cond delay="0" evt="onNext">
-                  <p:tgtEl>
-                    <p:sldTgt/>
-                  </p:tgtEl>
-                </p:cond>
-              </p:nextCondLst>
-            </p:seq>
-          </p:childTnLst>
-        </p:cTn>
-      </p:par>
-    </p:tnLst>
-  </p:timing>
 </p:sld>
 </file>
 
@@ -3405,7 +2840,7 @@
               <a:rPr lang="en-GB" sz="3200">
                 <a:latin typeface="DejaVu Sans"/>
               </a:rPr>
-              <a:t>Implementovať desktopovú aplikáciu na správu médii s vydeoobsahom.</a:t>
+              <a:t>Implementovať desktopovú aplikáciu na správu médii s videoobsahom.</a:t>
             </a:r>
             <a:endParaRPr/>
           </a:p>
@@ -3419,7 +2854,7 @@
               <a:rPr lang="en-GB" sz="3200">
                 <a:latin typeface="DejaVu Sans"/>
               </a:rPr>
-              <a:t>Implementácia nad platformou Java</a:t>
+              <a:t>Implementácia nad platformou Java.</a:t>
             </a:r>
             <a:endParaRPr/>
           </a:p>
@@ -3447,7 +2882,7 @@
               <a:rPr lang="en-GB" sz="3200">
                 <a:latin typeface="DejaVu Sans"/>
               </a:rPr>
-              <a:t>Vstup a výstup kartotéky bude zosit v ODF formáte</a:t>
+              <a:t>Vstup a výstup kartotéky bude zošit v ODF.</a:t>
             </a:r>
             <a:endParaRPr/>
           </a:p>
@@ -3455,33 +2890,6 @@
       </p:sp>
     </p:spTree>
   </p:cSld>
-  <p:timing>
-    <p:tnLst>
-      <p:par>
-        <p:cTn id="7" dur="indefinite" restart="never" nodeType="tmRoot">
-          <p:childTnLst>
-            <p:seq>
-              <p:cTn id="8" nodeType="mainSeq"/>
-              <p:prevCondLst>
-                <p:cond delay="0" evt="onPrev">
-                  <p:tgtEl>
-                    <p:sldTgt/>
-                  </p:tgtEl>
-                </p:cond>
-              </p:prevCondLst>
-              <p:nextCondLst>
-                <p:cond delay="0" evt="onNext">
-                  <p:tgtEl>
-                    <p:sldTgt/>
-                  </p:tgtEl>
-                </p:cond>
-              </p:nextCondLst>
-            </p:seq>
-          </p:childTnLst>
-        </p:cTn>
-      </p:par>
-    </p:tnLst>
-  </p:timing>
 </p:sld>
 </file>
 
@@ -3529,7 +2937,7 @@
               <a:rPr lang="en-GB" sz="4400">
                 <a:latin typeface="DejaVu Sans"/>
               </a:rPr>
-              <a:t>Funkctné požiadavky</a:t>
+              <a:t>Funkčné požiadavky</a:t>
             </a:r>
             <a:endParaRPr/>
           </a:p>
@@ -3566,7 +2974,7 @@
               <a:rPr lang="en-GB" sz="3200">
                 <a:latin typeface="DejaVu Sans"/>
               </a:rPr>
-              <a:t>Pridanie kategórie media</a:t>
+              <a:t>Pridanie kategórie média</a:t>
             </a:r>
             <a:endParaRPr/>
           </a:p>
@@ -3594,7 +3002,7 @@
               <a:rPr lang="en-GB" sz="3200">
                 <a:latin typeface="DejaVu Sans"/>
               </a:rPr>
-              <a:t>Vyhľadanie média v kartotéke</a:t>
+              <a:t>Vyhľadávanie média v kartotéke</a:t>
             </a:r>
             <a:endParaRPr/>
           </a:p>
@@ -3636,7 +3044,7 @@
               <a:rPr lang="en-GB" sz="3200">
                 <a:latin typeface="DejaVu Sans"/>
               </a:rPr>
-              <a:t>Zmena kategórie u média</a:t>
+              <a:t>Zmena kategórie média</a:t>
             </a:r>
             <a:endParaRPr/>
           </a:p>
@@ -3644,33 +3052,6 @@
       </p:sp>
     </p:spTree>
   </p:cSld>
-  <p:timing>
-    <p:tnLst>
-      <p:par>
-        <p:cTn id="9" dur="indefinite" restart="never" nodeType="tmRoot">
-          <p:childTnLst>
-            <p:seq>
-              <p:cTn id="10" nodeType="mainSeq"/>
-              <p:prevCondLst>
-                <p:cond delay="0" evt="onPrev">
-                  <p:tgtEl>
-                    <p:sldTgt/>
-                  </p:tgtEl>
-                </p:cond>
-              </p:prevCondLst>
-              <p:nextCondLst>
-                <p:cond delay="0" evt="onNext">
-                  <p:tgtEl>
-                    <p:sldTgt/>
-                  </p:tgtEl>
-                </p:cond>
-              </p:nextCondLst>
-            </p:seq>
-          </p:childTnLst>
-        </p:cTn>
-      </p:par>
-    </p:tnLst>
-  </p:timing>
 </p:sld>
 </file>
 
@@ -3817,7 +3198,7 @@
               <a:rPr lang="en-GB" sz="3200">
                 <a:latin typeface="DejaVu Sans"/>
               </a:rPr>
-              <a:t>Manager kartoteky</a:t>
+              <a:t>Manažér kartotéky</a:t>
             </a:r>
             <a:endParaRPr/>
           </a:p>
@@ -3831,7 +3212,7 @@
               <a:rPr lang="en-GB" sz="3200">
                 <a:latin typeface="DejaVu Sans"/>
               </a:rPr>
-              <a:t>Logovanie jednotlivých akcii</a:t>
+              <a:t>Logovanie jednotlivých akcií</a:t>
             </a:r>
             <a:endParaRPr/>
           </a:p>
@@ -3839,33 +3220,6 @@
       </p:sp>
     </p:spTree>
   </p:cSld>
-  <p:timing>
-    <p:tnLst>
-      <p:par>
-        <p:cTn id="11" dur="indefinite" restart="never" nodeType="tmRoot">
-          <p:childTnLst>
-            <p:seq>
-              <p:cTn id="12" nodeType="mainSeq"/>
-              <p:prevCondLst>
-                <p:cond delay="0" evt="onPrev">
-                  <p:tgtEl>
-                    <p:sldTgt/>
-                  </p:tgtEl>
-                </p:cond>
-              </p:prevCondLst>
-              <p:nextCondLst>
-                <p:cond delay="0" evt="onNext">
-                  <p:tgtEl>
-                    <p:sldTgt/>
-                  </p:tgtEl>
-                </p:cond>
-              </p:nextCondLst>
-            </p:seq>
-          </p:childTnLst>
-        </p:cTn>
-      </p:par>
-    </p:tnLst>
-  </p:timing>
 </p:sld>
 </file>
 
@@ -4042,33 +3396,6 @@
       </p:sp>
     </p:spTree>
   </p:cSld>
-  <p:timing>
-    <p:tnLst>
-      <p:par>
-        <p:cTn id="13" dur="indefinite" restart="never" nodeType="tmRoot">
-          <p:childTnLst>
-            <p:seq>
-              <p:cTn id="14" nodeType="mainSeq"/>
-              <p:prevCondLst>
-                <p:cond delay="0" evt="onPrev">
-                  <p:tgtEl>
-                    <p:sldTgt/>
-                  </p:tgtEl>
-                </p:cond>
-              </p:prevCondLst>
-              <p:nextCondLst>
-                <p:cond delay="0" evt="onNext">
-                  <p:tgtEl>
-                    <p:sldTgt/>
-                  </p:tgtEl>
-                </p:cond>
-              </p:nextCondLst>
-            </p:seq>
-          </p:childTnLst>
-        </p:cTn>
-      </p:par>
-    </p:tnLst>
-  </p:timing>
 </p:sld>
 </file>
 
@@ -4147,33 +3474,6 @@
       </p:pic>
     </p:spTree>
   </p:cSld>
-  <p:timing>
-    <p:tnLst>
-      <p:par>
-        <p:cTn id="15" dur="indefinite" restart="never" nodeType="tmRoot">
-          <p:childTnLst>
-            <p:seq>
-              <p:cTn id="16" nodeType="mainSeq"/>
-              <p:prevCondLst>
-                <p:cond delay="0" evt="onPrev">
-                  <p:tgtEl>
-                    <p:sldTgt/>
-                  </p:tgtEl>
-                </p:cond>
-              </p:prevCondLst>
-              <p:nextCondLst>
-                <p:cond delay="0" evt="onNext">
-                  <p:tgtEl>
-                    <p:sldTgt/>
-                  </p:tgtEl>
-                </p:cond>
-              </p:nextCondLst>
-            </p:seq>
-          </p:childTnLst>
-        </p:cTn>
-      </p:par>
-    </p:tnLst>
-  </p:timing>
 </p:sld>
 </file>
 
@@ -4252,33 +3552,6 @@
       </p:pic>
     </p:spTree>
   </p:cSld>
-  <p:timing>
-    <p:tnLst>
-      <p:par>
-        <p:cTn id="17" dur="indefinite" restart="never" nodeType="tmRoot">
-          <p:childTnLst>
-            <p:seq>
-              <p:cTn id="18" nodeType="mainSeq"/>
-              <p:prevCondLst>
-                <p:cond delay="0" evt="onPrev">
-                  <p:tgtEl>
-                    <p:sldTgt/>
-                  </p:tgtEl>
-                </p:cond>
-              </p:prevCondLst>
-              <p:nextCondLst>
-                <p:cond delay="0" evt="onNext">
-                  <p:tgtEl>
-                    <p:sldTgt/>
-                  </p:tgtEl>
-                </p:cond>
-              </p:nextCondLst>
-            </p:seq>
-          </p:childTnLst>
-        </p:cTn>
-      </p:par>
-    </p:tnLst>
-  </p:timing>
 </p:sld>
 </file>
 

</xml_diff>

<commit_message>
Presentation -> Final version
</commit_message>
<xml_diff>
--- a/doc/presentation/Prezentacia.pptx
+++ b/doc/presentation/Prezentacia.pptx
@@ -1445,7 +1445,7 @@
           <a:bodyPr lIns="0" rIns="0" tIns="0" bIns="0"/>
           <a:p>
             <a:pPr algn="r"/>
-            <a:fld id="{2A3D7521-9644-4AEE-AB28-9B47320000E7}" type="slidenum">
+            <a:fld id="{C307F3D2-E6BA-4474-9101-95493C7CBEAA}" type="slidenum">
               <a:rPr lang="en-GB" sz="1400">
                 <a:latin typeface="DejaVu Serif"/>
               </a:rPr>
@@ -1559,8 +1559,58 @@
           </a:p>
         </p:txBody>
       </p:sp>
+      <p:pic>
+        <p:nvPicPr>
+          <p:cNvPr id="40" name="" descr=""/>
+          <p:cNvPicPr/>
+          <p:nvPr/>
+        </p:nvPicPr>
+        <p:blipFill>
+          <a:blip r:embed="rId1"/>
+          <a:stretch/>
+        </p:blipFill>
+        <p:spPr>
+          <a:xfrm>
+            <a:off x="4097520" y="5256000"/>
+            <a:ext cx="1806480" cy="1836720"/>
+          </a:xfrm>
+          <a:prstGeom prst="rect">
+            <a:avLst/>
+          </a:prstGeom>
+          <a:ln>
+            <a:noFill/>
+          </a:ln>
+        </p:spPr>
+      </p:pic>
     </p:spTree>
   </p:cSld>
+  <p:timing>
+    <p:tnLst>
+      <p:par>
+        <p:cTn id="1" dur="indefinite" restart="never" nodeType="tmRoot">
+          <p:childTnLst>
+            <p:seq>
+              <p:cTn id="2" nodeType="mainSeq"/>
+              <p:prevCondLst>
+                <p:cond delay="0" evt="onPrev">
+                  <p:tgtEl>
+                    <p:sldTgt/>
+                  </p:tgtEl>
+                </p:cond>
+              </p:prevCondLst>
+              <p:nextCondLst>
+                <p:cond delay="0" evt="onNext">
+                  <p:tgtEl>
+                    <p:sldTgt/>
+                  </p:tgtEl>
+                </p:cond>
+              </p:nextCondLst>
+            </p:seq>
+          </p:childTnLst>
+        </p:cTn>
+      </p:par>
+    </p:tnLst>
+  </p:timing>
 </p:sld>
 </file>
 
@@ -1583,7 +1633,7 @@
       </p:grpSpPr>
       <p:sp>
         <p:nvSpPr>
-          <p:cNvPr id="56" name="TextShape 1"/>
+          <p:cNvPr id="63" name="TextShape 1"/>
           <p:cNvSpPr txBox="1"/>
           <p:nvPr/>
         </p:nvSpPr>
@@ -1616,7 +1666,7 @@
       </p:sp>
       <p:pic>
         <p:nvPicPr>
-          <p:cNvPr id="57" name="" descr=""/>
+          <p:cNvPr id="64" name="" descr=""/>
           <p:cNvPicPr/>
           <p:nvPr/>
         </p:nvPicPr>
@@ -1661,7 +1711,7 @@
       </p:grpSpPr>
       <p:sp>
         <p:nvSpPr>
-          <p:cNvPr id="58" name="TextShape 1"/>
+          <p:cNvPr id="65" name="TextShape 1"/>
           <p:cNvSpPr txBox="1"/>
           <p:nvPr/>
         </p:nvSpPr>
@@ -1694,7 +1744,7 @@
       </p:sp>
       <p:pic>
         <p:nvPicPr>
-          <p:cNvPr id="59" name="" descr=""/>
+          <p:cNvPr id="66" name="" descr=""/>
           <p:cNvPicPr/>
           <p:nvPr/>
         </p:nvPicPr>
@@ -1739,7 +1789,7 @@
       </p:grpSpPr>
       <p:sp>
         <p:nvSpPr>
-          <p:cNvPr id="60" name="TextShape 1"/>
+          <p:cNvPr id="67" name="TextShape 1"/>
           <p:cNvSpPr txBox="1"/>
           <p:nvPr/>
         </p:nvSpPr>
@@ -1772,7 +1822,7 @@
       </p:sp>
       <p:pic>
         <p:nvPicPr>
-          <p:cNvPr id="61" name="" descr=""/>
+          <p:cNvPr id="68" name="" descr=""/>
           <p:cNvPicPr/>
           <p:nvPr/>
         </p:nvPicPr>
@@ -1817,7 +1867,7 @@
       </p:grpSpPr>
       <p:sp>
         <p:nvSpPr>
-          <p:cNvPr id="62" name="TextShape 1"/>
+          <p:cNvPr id="69" name="TextShape 1"/>
           <p:cNvSpPr txBox="1"/>
           <p:nvPr/>
         </p:nvSpPr>
@@ -1850,7 +1900,7 @@
       </p:sp>
       <p:pic>
         <p:nvPicPr>
-          <p:cNvPr id="63" name="" descr=""/>
+          <p:cNvPr id="70" name="" descr=""/>
           <p:cNvPicPr/>
           <p:nvPr/>
         </p:nvPicPr>
@@ -1895,7 +1945,7 @@
       </p:grpSpPr>
       <p:sp>
         <p:nvSpPr>
-          <p:cNvPr id="64" name="TextShape 1"/>
+          <p:cNvPr id="71" name="TextShape 1"/>
           <p:cNvSpPr txBox="1"/>
           <p:nvPr/>
         </p:nvSpPr>
@@ -1928,7 +1978,7 @@
       </p:sp>
       <p:pic>
         <p:nvPicPr>
-          <p:cNvPr id="65" name="" descr=""/>
+          <p:cNvPr id="72" name="" descr=""/>
           <p:cNvPicPr/>
           <p:nvPr/>
         </p:nvPicPr>
@@ -1973,7 +2023,7 @@
       </p:grpSpPr>
       <p:sp>
         <p:nvSpPr>
-          <p:cNvPr id="66" name="TextShape 1"/>
+          <p:cNvPr id="73" name="TextShape 1"/>
           <p:cNvSpPr txBox="1"/>
           <p:nvPr/>
         </p:nvSpPr>
@@ -2006,7 +2056,7 @@
       </p:sp>
       <p:pic>
         <p:nvPicPr>
-          <p:cNvPr id="67" name="" descr=""/>
+          <p:cNvPr id="74" name="" descr=""/>
           <p:cNvPicPr/>
           <p:nvPr/>
         </p:nvPicPr>
@@ -2051,7 +2101,7 @@
       </p:grpSpPr>
       <p:sp>
         <p:nvSpPr>
-          <p:cNvPr id="68" name="TextShape 1"/>
+          <p:cNvPr id="75" name="TextShape 1"/>
           <p:cNvSpPr txBox="1"/>
           <p:nvPr/>
         </p:nvSpPr>
@@ -2084,7 +2134,7 @@
       </p:sp>
       <p:pic>
         <p:nvPicPr>
-          <p:cNvPr id="69" name="" descr=""/>
+          <p:cNvPr id="76" name="" descr=""/>
           <p:cNvPicPr/>
           <p:nvPr/>
         </p:nvPicPr>
@@ -2129,7 +2179,7 @@
       </p:grpSpPr>
       <p:sp>
         <p:nvSpPr>
-          <p:cNvPr id="70" name="TextShape 1"/>
+          <p:cNvPr id="77" name="TextShape 1"/>
           <p:cNvSpPr txBox="1"/>
           <p:nvPr/>
         </p:nvSpPr>
@@ -2162,7 +2212,7 @@
       </p:sp>
       <p:pic>
         <p:nvPicPr>
-          <p:cNvPr id="71" name="" descr=""/>
+          <p:cNvPr id="78" name="" descr=""/>
           <p:cNvPicPr/>
           <p:nvPr/>
         </p:nvPicPr>
@@ -2207,7 +2257,7 @@
       </p:grpSpPr>
       <p:sp>
         <p:nvSpPr>
-          <p:cNvPr id="72" name="TextShape 1"/>
+          <p:cNvPr id="79" name="TextShape 1"/>
           <p:cNvSpPr txBox="1"/>
           <p:nvPr/>
         </p:nvSpPr>
@@ -2240,7 +2290,7 @@
       </p:sp>
       <p:pic>
         <p:nvPicPr>
-          <p:cNvPr id="73" name="" descr=""/>
+          <p:cNvPr id="80" name="" descr=""/>
           <p:cNvPicPr/>
           <p:nvPr/>
         </p:nvPicPr>
@@ -2285,7 +2335,7 @@
       </p:grpSpPr>
       <p:sp>
         <p:nvSpPr>
-          <p:cNvPr id="74" name="TextShape 1"/>
+          <p:cNvPr id="81" name="TextShape 1"/>
           <p:cNvSpPr txBox="1"/>
           <p:nvPr/>
         </p:nvSpPr>
@@ -2318,7 +2368,7 @@
       </p:sp>
       <p:pic>
         <p:nvPicPr>
-          <p:cNvPr id="75" name="" descr=""/>
+          <p:cNvPr id="82" name="" descr=""/>
           <p:cNvPicPr/>
           <p:nvPr/>
         </p:nvPicPr>
@@ -2363,7 +2413,7 @@
       </p:grpSpPr>
       <p:sp>
         <p:nvSpPr>
-          <p:cNvPr id="40" name="TextShape 1"/>
+          <p:cNvPr id="41" name="TextShape 1"/>
           <p:cNvSpPr txBox="1"/>
           <p:nvPr/>
         </p:nvSpPr>
@@ -2396,7 +2446,7 @@
       </p:sp>
       <p:sp>
         <p:nvSpPr>
-          <p:cNvPr id="41" name="TextShape 2"/>
+          <p:cNvPr id="42" name="TextShape 2"/>
           <p:cNvSpPr txBox="1"/>
           <p:nvPr/>
         </p:nvSpPr>
@@ -2459,8 +2509,58 @@
           </a:p>
         </p:txBody>
       </p:sp>
+      <p:pic>
+        <p:nvPicPr>
+          <p:cNvPr id="43" name="" descr=""/>
+          <p:cNvPicPr/>
+          <p:nvPr/>
+        </p:nvPicPr>
+        <p:blipFill>
+          <a:blip r:embed="rId1"/>
+          <a:stretch/>
+        </p:blipFill>
+        <p:spPr>
+          <a:xfrm>
+            <a:off x="792000" y="5256000"/>
+            <a:ext cx="3137760" cy="1882440"/>
+          </a:xfrm>
+          <a:prstGeom prst="rect">
+            <a:avLst/>
+          </a:prstGeom>
+          <a:ln>
+            <a:noFill/>
+          </a:ln>
+        </p:spPr>
+      </p:pic>
     </p:spTree>
   </p:cSld>
+  <p:timing>
+    <p:tnLst>
+      <p:par>
+        <p:cTn id="3" dur="indefinite" restart="never" nodeType="tmRoot">
+          <p:childTnLst>
+            <p:seq>
+              <p:cTn id="4" nodeType="mainSeq"/>
+              <p:prevCondLst>
+                <p:cond delay="0" evt="onPrev">
+                  <p:tgtEl>
+                    <p:sldTgt/>
+                  </p:tgtEl>
+                </p:cond>
+              </p:prevCondLst>
+              <p:nextCondLst>
+                <p:cond delay="0" evt="onNext">
+                  <p:tgtEl>
+                    <p:sldTgt/>
+                  </p:tgtEl>
+                </p:cond>
+              </p:nextCondLst>
+            </p:seq>
+          </p:childTnLst>
+        </p:cTn>
+      </p:par>
+    </p:tnLst>
+  </p:timing>
 </p:sld>
 </file>
 
@@ -2483,7 +2583,7 @@
       </p:grpSpPr>
       <p:sp>
         <p:nvSpPr>
-          <p:cNvPr id="76" name="TextShape 1"/>
+          <p:cNvPr id="83" name="TextShape 1"/>
           <p:cNvSpPr txBox="1"/>
           <p:nvPr/>
         </p:nvSpPr>
@@ -2516,7 +2616,7 @@
       </p:sp>
       <p:pic>
         <p:nvPicPr>
-          <p:cNvPr id="77" name="" descr=""/>
+          <p:cNvPr id="84" name="" descr=""/>
           <p:cNvPicPr/>
           <p:nvPr/>
         </p:nvPicPr>
@@ -2561,7 +2661,7 @@
       </p:grpSpPr>
       <p:sp>
         <p:nvSpPr>
-          <p:cNvPr id="78" name="TextShape 1"/>
+          <p:cNvPr id="85" name="TextShape 1"/>
           <p:cNvSpPr txBox="1"/>
           <p:nvPr/>
         </p:nvSpPr>
@@ -2616,7 +2716,7 @@
       </p:grpSpPr>
       <p:sp>
         <p:nvSpPr>
-          <p:cNvPr id="42" name="TextShape 1"/>
+          <p:cNvPr id="44" name="TextShape 1"/>
           <p:cNvSpPr txBox="1"/>
           <p:nvPr/>
         </p:nvSpPr>
@@ -2649,7 +2749,7 @@
       </p:sp>
       <p:sp>
         <p:nvSpPr>
-          <p:cNvPr id="43" name="TextShape 2"/>
+          <p:cNvPr id="45" name="TextShape 2"/>
           <p:cNvSpPr txBox="1"/>
           <p:nvPr/>
         </p:nvSpPr>
@@ -2754,8 +2854,58 @@
           </a:p>
         </p:txBody>
       </p:sp>
+      <p:pic>
+        <p:nvPicPr>
+          <p:cNvPr id="46" name="" descr=""/>
+          <p:cNvPicPr/>
+          <p:nvPr/>
+        </p:nvPicPr>
+        <p:blipFill>
+          <a:blip r:embed="rId1"/>
+          <a:stretch/>
+        </p:blipFill>
+        <p:spPr>
+          <a:xfrm>
+            <a:off x="360000" y="72000"/>
+            <a:ext cx="1656000" cy="1656000"/>
+          </a:xfrm>
+          <a:prstGeom prst="rect">
+            <a:avLst/>
+          </a:prstGeom>
+          <a:ln>
+            <a:noFill/>
+          </a:ln>
+        </p:spPr>
+      </p:pic>
     </p:spTree>
   </p:cSld>
+  <p:timing>
+    <p:tnLst>
+      <p:par>
+        <p:cTn id="5" dur="indefinite" restart="never" nodeType="tmRoot">
+          <p:childTnLst>
+            <p:seq>
+              <p:cTn id="6" nodeType="mainSeq"/>
+              <p:prevCondLst>
+                <p:cond delay="0" evt="onPrev">
+                  <p:tgtEl>
+                    <p:sldTgt/>
+                  </p:tgtEl>
+                </p:cond>
+              </p:prevCondLst>
+              <p:nextCondLst>
+                <p:cond delay="0" evt="onNext">
+                  <p:tgtEl>
+                    <p:sldTgt/>
+                  </p:tgtEl>
+                </p:cond>
+              </p:nextCondLst>
+            </p:seq>
+          </p:childTnLst>
+        </p:cTn>
+      </p:par>
+    </p:tnLst>
+  </p:timing>
 </p:sld>
 </file>
 
@@ -2778,7 +2928,7 @@
       </p:grpSpPr>
       <p:sp>
         <p:nvSpPr>
-          <p:cNvPr id="44" name="TextShape 1"/>
+          <p:cNvPr id="47" name="TextShape 1"/>
           <p:cNvSpPr txBox="1"/>
           <p:nvPr/>
         </p:nvSpPr>
@@ -2811,7 +2961,7 @@
       </p:sp>
       <p:sp>
         <p:nvSpPr>
-          <p:cNvPr id="45" name="TextShape 2"/>
+          <p:cNvPr id="48" name="TextShape 2"/>
           <p:cNvSpPr txBox="1"/>
           <p:nvPr/>
         </p:nvSpPr>
@@ -2888,8 +3038,58 @@
           </a:p>
         </p:txBody>
       </p:sp>
+      <p:pic>
+        <p:nvPicPr>
+          <p:cNvPr id="49" name="" descr=""/>
+          <p:cNvPicPr/>
+          <p:nvPr/>
+        </p:nvPicPr>
+        <p:blipFill>
+          <a:blip r:embed="rId1"/>
+          <a:stretch/>
+        </p:blipFill>
+        <p:spPr>
+          <a:xfrm>
+            <a:off x="6696000" y="5184000"/>
+            <a:ext cx="1872000" cy="1872000"/>
+          </a:xfrm>
+          <a:prstGeom prst="rect">
+            <a:avLst/>
+          </a:prstGeom>
+          <a:ln>
+            <a:noFill/>
+          </a:ln>
+        </p:spPr>
+      </p:pic>
     </p:spTree>
   </p:cSld>
+  <p:timing>
+    <p:tnLst>
+      <p:par>
+        <p:cTn id="7" dur="indefinite" restart="never" nodeType="tmRoot">
+          <p:childTnLst>
+            <p:seq>
+              <p:cTn id="8" nodeType="mainSeq"/>
+              <p:prevCondLst>
+                <p:cond delay="0" evt="onPrev">
+                  <p:tgtEl>
+                    <p:sldTgt/>
+                  </p:tgtEl>
+                </p:cond>
+              </p:prevCondLst>
+              <p:nextCondLst>
+                <p:cond delay="0" evt="onNext">
+                  <p:tgtEl>
+                    <p:sldTgt/>
+                  </p:tgtEl>
+                </p:cond>
+              </p:nextCondLst>
+            </p:seq>
+          </p:childTnLst>
+        </p:cTn>
+      </p:par>
+    </p:tnLst>
+  </p:timing>
 </p:sld>
 </file>
 
@@ -2912,7 +3112,7 @@
       </p:grpSpPr>
       <p:sp>
         <p:nvSpPr>
-          <p:cNvPr id="46" name="TextShape 1"/>
+          <p:cNvPr id="50" name="TextShape 1"/>
           <p:cNvSpPr txBox="1"/>
           <p:nvPr/>
         </p:nvSpPr>
@@ -2945,7 +3145,7 @@
       </p:sp>
       <p:sp>
         <p:nvSpPr>
-          <p:cNvPr id="47" name="TextShape 2"/>
+          <p:cNvPr id="51" name="TextShape 2"/>
           <p:cNvSpPr txBox="1"/>
           <p:nvPr/>
         </p:nvSpPr>
@@ -3052,6 +3252,33 @@
       </p:sp>
     </p:spTree>
   </p:cSld>
+  <p:timing>
+    <p:tnLst>
+      <p:par>
+        <p:cTn id="9" dur="indefinite" restart="never" nodeType="tmRoot">
+          <p:childTnLst>
+            <p:seq>
+              <p:cTn id="10" nodeType="mainSeq"/>
+              <p:prevCondLst>
+                <p:cond delay="0" evt="onPrev">
+                  <p:tgtEl>
+                    <p:sldTgt/>
+                  </p:tgtEl>
+                </p:cond>
+              </p:prevCondLst>
+              <p:nextCondLst>
+                <p:cond delay="0" evt="onNext">
+                  <p:tgtEl>
+                    <p:sldTgt/>
+                  </p:tgtEl>
+                </p:cond>
+              </p:nextCondLst>
+            </p:seq>
+          </p:childTnLst>
+        </p:cTn>
+      </p:par>
+    </p:tnLst>
+  </p:timing>
 </p:sld>
 </file>
 
@@ -3074,7 +3301,7 @@
       </p:grpSpPr>
       <p:sp>
         <p:nvSpPr>
-          <p:cNvPr id="48" name="TextShape 1"/>
+          <p:cNvPr id="52" name="TextShape 1"/>
           <p:cNvSpPr txBox="1"/>
           <p:nvPr/>
         </p:nvSpPr>
@@ -3107,7 +3334,7 @@
       </p:sp>
       <p:sp>
         <p:nvSpPr>
-          <p:cNvPr id="49" name="TextShape 2"/>
+          <p:cNvPr id="53" name="TextShape 2"/>
           <p:cNvSpPr txBox="1"/>
           <p:nvPr/>
         </p:nvSpPr>
@@ -3218,8 +3445,58 @@
           </a:p>
         </p:txBody>
       </p:sp>
+      <p:pic>
+        <p:nvPicPr>
+          <p:cNvPr id="54" name="" descr=""/>
+          <p:cNvPicPr/>
+          <p:nvPr/>
+        </p:nvPicPr>
+        <p:blipFill>
+          <a:blip r:embed="rId1"/>
+          <a:stretch/>
+        </p:blipFill>
+        <p:spPr>
+          <a:xfrm>
+            <a:off x="6768000" y="1833480"/>
+            <a:ext cx="2180880" cy="542520"/>
+          </a:xfrm>
+          <a:prstGeom prst="rect">
+            <a:avLst/>
+          </a:prstGeom>
+          <a:ln>
+            <a:noFill/>
+          </a:ln>
+        </p:spPr>
+      </p:pic>
     </p:spTree>
   </p:cSld>
+  <p:timing>
+    <p:tnLst>
+      <p:par>
+        <p:cTn id="11" dur="indefinite" restart="never" nodeType="tmRoot">
+          <p:childTnLst>
+            <p:seq>
+              <p:cTn id="12" nodeType="mainSeq"/>
+              <p:prevCondLst>
+                <p:cond delay="0" evt="onPrev">
+                  <p:tgtEl>
+                    <p:sldTgt/>
+                  </p:tgtEl>
+                </p:cond>
+              </p:prevCondLst>
+              <p:nextCondLst>
+                <p:cond delay="0" evt="onNext">
+                  <p:tgtEl>
+                    <p:sldTgt/>
+                  </p:tgtEl>
+                </p:cond>
+              </p:nextCondLst>
+            </p:seq>
+          </p:childTnLst>
+        </p:cTn>
+      </p:par>
+    </p:tnLst>
+  </p:timing>
 </p:sld>
 </file>
 
@@ -3242,7 +3519,7 @@
       </p:grpSpPr>
       <p:sp>
         <p:nvSpPr>
-          <p:cNvPr id="50" name="TextShape 1"/>
+          <p:cNvPr id="55" name="TextShape 1"/>
           <p:cNvSpPr txBox="1"/>
           <p:nvPr/>
         </p:nvSpPr>
@@ -3275,7 +3552,7 @@
       </p:sp>
       <p:sp>
         <p:nvSpPr>
-          <p:cNvPr id="51" name="TextShape 2"/>
+          <p:cNvPr id="56" name="TextShape 2"/>
           <p:cNvSpPr txBox="1"/>
           <p:nvPr/>
         </p:nvSpPr>
@@ -3394,8 +3671,81 @@
           </a:p>
         </p:txBody>
       </p:sp>
+      <p:pic>
+        <p:nvPicPr>
+          <p:cNvPr id="57" name="" descr=""/>
+          <p:cNvPicPr/>
+          <p:nvPr/>
+        </p:nvPicPr>
+        <p:blipFill>
+          <a:blip r:embed="rId1"/>
+          <a:stretch/>
+        </p:blipFill>
+        <p:spPr>
+          <a:xfrm>
+            <a:off x="5940360" y="1530360"/>
+            <a:ext cx="3131640" cy="1565640"/>
+          </a:xfrm>
+          <a:prstGeom prst="rect">
+            <a:avLst/>
+          </a:prstGeom>
+          <a:ln>
+            <a:noFill/>
+          </a:ln>
+        </p:spPr>
+      </p:pic>
+      <p:pic>
+        <p:nvPicPr>
+          <p:cNvPr id="58" name="" descr=""/>
+          <p:cNvPicPr/>
+          <p:nvPr/>
+        </p:nvPicPr>
+        <p:blipFill>
+          <a:blip r:embed="rId2"/>
+          <a:stretch/>
+        </p:blipFill>
+        <p:spPr>
+          <a:xfrm>
+            <a:off x="5976000" y="3724920"/>
+            <a:ext cx="3238920" cy="955080"/>
+          </a:xfrm>
+          <a:prstGeom prst="rect">
+            <a:avLst/>
+          </a:prstGeom>
+          <a:ln>
+            <a:noFill/>
+          </a:ln>
+        </p:spPr>
+      </p:pic>
     </p:spTree>
   </p:cSld>
+  <p:timing>
+    <p:tnLst>
+      <p:par>
+        <p:cTn id="13" dur="indefinite" restart="never" nodeType="tmRoot">
+          <p:childTnLst>
+            <p:seq>
+              <p:cTn id="14" nodeType="mainSeq"/>
+              <p:prevCondLst>
+                <p:cond delay="0" evt="onPrev">
+                  <p:tgtEl>
+                    <p:sldTgt/>
+                  </p:tgtEl>
+                </p:cond>
+              </p:prevCondLst>
+              <p:nextCondLst>
+                <p:cond delay="0" evt="onNext">
+                  <p:tgtEl>
+                    <p:sldTgt/>
+                  </p:tgtEl>
+                </p:cond>
+              </p:nextCondLst>
+            </p:seq>
+          </p:childTnLst>
+        </p:cTn>
+      </p:par>
+    </p:tnLst>
+  </p:timing>
 </p:sld>
 </file>
 
@@ -3418,7 +3768,7 @@
       </p:grpSpPr>
       <p:sp>
         <p:nvSpPr>
-          <p:cNvPr id="52" name="TextShape 1"/>
+          <p:cNvPr id="59" name="TextShape 1"/>
           <p:cNvSpPr txBox="1"/>
           <p:nvPr/>
         </p:nvSpPr>
@@ -3451,7 +3801,7 @@
       </p:sp>
       <p:pic>
         <p:nvPicPr>
-          <p:cNvPr id="53" name="" descr=""/>
+          <p:cNvPr id="60" name="" descr=""/>
           <p:cNvPicPr/>
           <p:nvPr/>
         </p:nvPicPr>
@@ -3474,6 +3824,33 @@
       </p:pic>
     </p:spTree>
   </p:cSld>
+  <p:timing>
+    <p:tnLst>
+      <p:par>
+        <p:cTn id="15" dur="indefinite" restart="never" nodeType="tmRoot">
+          <p:childTnLst>
+            <p:seq>
+              <p:cTn id="16" nodeType="mainSeq"/>
+              <p:prevCondLst>
+                <p:cond delay="0" evt="onPrev">
+                  <p:tgtEl>
+                    <p:sldTgt/>
+                  </p:tgtEl>
+                </p:cond>
+              </p:prevCondLst>
+              <p:nextCondLst>
+                <p:cond delay="0" evt="onNext">
+                  <p:tgtEl>
+                    <p:sldTgt/>
+                  </p:tgtEl>
+                </p:cond>
+              </p:nextCondLst>
+            </p:seq>
+          </p:childTnLst>
+        </p:cTn>
+      </p:par>
+    </p:tnLst>
+  </p:timing>
 </p:sld>
 </file>
 
@@ -3496,7 +3873,7 @@
       </p:grpSpPr>
       <p:sp>
         <p:nvSpPr>
-          <p:cNvPr id="54" name="TextShape 1"/>
+          <p:cNvPr id="61" name="TextShape 1"/>
           <p:cNvSpPr txBox="1"/>
           <p:nvPr/>
         </p:nvSpPr>
@@ -3529,7 +3906,7 @@
       </p:sp>
       <p:pic>
         <p:nvPicPr>
-          <p:cNvPr id="55" name="" descr=""/>
+          <p:cNvPr id="62" name="" descr=""/>
           <p:cNvPicPr/>
           <p:nvPr/>
         </p:nvPicPr>

</xml_diff>